<commit_message>
Section 1&2 of final writeup
</commit_message>
<xml_diff>
--- a/W241 Presentation.pptx
+++ b/W241 Presentation.pptx
@@ -8,8 +8,9 @@
     <p:sldId id="256" r:id="rId2"/>
     <p:sldId id="257" r:id="rId3"/>
     <p:sldId id="258" r:id="rId4"/>
-    <p:sldId id="259" r:id="rId5"/>
-    <p:sldId id="260" r:id="rId6"/>
+    <p:sldId id="261" r:id="rId5"/>
+    <p:sldId id="259" r:id="rId6"/>
+    <p:sldId id="260" r:id="rId7"/>
   </p:sldIdLst>
   <p:sldSz cx="12192000" cy="6858000"/>
   <p:notesSz cx="6858000" cy="9144000"/>
@@ -108,6 +109,11 @@
       </a:defRPr>
     </a:lvl9pPr>
   </p:defaultTextStyle>
+  <p:extLst>
+    <p:ext uri="{EFAFB233-063F-42B5-8137-9DF3F51BA10A}">
+      <p15:sldGuideLst xmlns:p15="http://schemas.microsoft.com/office/powerpoint/2012/main"/>
+    </p:ext>
+  </p:extLst>
 </p:presentation>
 </file>
 
@@ -357,7 +363,7 @@
             <a:fld id="{B61BEF0D-F0BB-DE4B-95CE-6DB70DBA9567}" type="datetimeFigureOut">
               <a:rPr lang="en-US" dirty="0"/>
               <a:pPr/>
-              <a:t>8/12/18</a:t>
+              <a:t>8/13/18</a:t>
             </a:fld>
             <a:endParaRPr lang="en-US" dirty="0"/>
           </a:p>
@@ -616,7 +622,7 @@
             <a:fld id="{B61BEF0D-F0BB-DE4B-95CE-6DB70DBA9567}" type="datetimeFigureOut">
               <a:rPr lang="en-US" dirty="0"/>
               <a:pPr/>
-              <a:t>8/12/18</a:t>
+              <a:t>8/13/18</a:t>
             </a:fld>
             <a:endParaRPr lang="en-US" dirty="0"/>
           </a:p>
@@ -848,7 +854,7 @@
             <a:fld id="{B61BEF0D-F0BB-DE4B-95CE-6DB70DBA9567}" type="datetimeFigureOut">
               <a:rPr lang="en-US" dirty="0"/>
               <a:pPr/>
-              <a:t>8/12/18</a:t>
+              <a:t>8/13/18</a:t>
             </a:fld>
             <a:endParaRPr lang="en-US" dirty="0"/>
           </a:p>
@@ -1085,7 +1091,7 @@
             <a:fld id="{B61BEF0D-F0BB-DE4B-95CE-6DB70DBA9567}" type="datetimeFigureOut">
               <a:rPr lang="en-US" dirty="0"/>
               <a:pPr/>
-              <a:t>8/12/18</a:t>
+              <a:t>8/13/18</a:t>
             </a:fld>
             <a:endParaRPr lang="en-US" dirty="0"/>
           </a:p>
@@ -1389,7 +1395,7 @@
             <a:fld id="{B61BEF0D-F0BB-DE4B-95CE-6DB70DBA9567}" type="datetimeFigureOut">
               <a:rPr lang="en-US" dirty="0"/>
               <a:pPr/>
-              <a:t>8/12/18</a:t>
+              <a:t>8/13/18</a:t>
             </a:fld>
             <a:endParaRPr lang="en-US" dirty="0"/>
           </a:p>
@@ -1688,7 +1694,7 @@
             <a:fld id="{B61BEF0D-F0BB-DE4B-95CE-6DB70DBA9567}" type="datetimeFigureOut">
               <a:rPr lang="en-US" dirty="0"/>
               <a:pPr/>
-              <a:t>8/12/18</a:t>
+              <a:t>8/13/18</a:t>
             </a:fld>
             <a:endParaRPr lang="en-US" dirty="0"/>
           </a:p>
@@ -2107,7 +2113,7 @@
             <a:fld id="{B61BEF0D-F0BB-DE4B-95CE-6DB70DBA9567}" type="datetimeFigureOut">
               <a:rPr lang="en-US" dirty="0"/>
               <a:pPr/>
-              <a:t>8/12/18</a:t>
+              <a:t>8/13/18</a:t>
             </a:fld>
             <a:endParaRPr lang="en-US" dirty="0"/>
           </a:p>
@@ -2266,7 +2272,7 @@
             <a:fld id="{B61BEF0D-F0BB-DE4B-95CE-6DB70DBA9567}" type="datetimeFigureOut">
               <a:rPr lang="en-US" dirty="0"/>
               <a:pPr/>
-              <a:t>8/12/18</a:t>
+              <a:t>8/13/18</a:t>
             </a:fld>
             <a:endParaRPr lang="en-US" dirty="0"/>
           </a:p>
@@ -2358,7 +2364,7 @@
             <a:fld id="{B61BEF0D-F0BB-DE4B-95CE-6DB70DBA9567}" type="datetimeFigureOut">
               <a:rPr lang="en-US" dirty="0"/>
               <a:pPr/>
-              <a:t>8/12/18</a:t>
+              <a:t>8/13/18</a:t>
             </a:fld>
             <a:endParaRPr lang="en-US" dirty="0"/>
           </a:p>
@@ -2733,7 +2739,7 @@
             <a:fld id="{B61BEF0D-F0BB-DE4B-95CE-6DB70DBA9567}" type="datetimeFigureOut">
               <a:rPr lang="en-US" dirty="0"/>
               <a:pPr/>
-              <a:t>8/12/18</a:t>
+              <a:t>8/13/18</a:t>
             </a:fld>
             <a:endParaRPr lang="en-US" dirty="0"/>
           </a:p>
@@ -3019,7 +3025,7 @@
             <a:fld id="{B61BEF0D-F0BB-DE4B-95CE-6DB70DBA9567}" type="datetimeFigureOut">
               <a:rPr lang="en-US" dirty="0"/>
               <a:pPr/>
-              <a:t>8/12/18</a:t>
+              <a:t>8/13/18</a:t>
             </a:fld>
             <a:endParaRPr lang="en-US" dirty="0"/>
           </a:p>
@@ -3227,7 +3233,7 @@
             <a:fld id="{B61BEF0D-F0BB-DE4B-95CE-6DB70DBA9567}" type="datetimeFigureOut">
               <a:rPr lang="en-US" dirty="0"/>
               <a:pPr/>
-              <a:t>8/12/18</a:t>
+              <a:t>8/13/18</a:t>
             </a:fld>
             <a:endParaRPr lang="en-US" dirty="0"/>
           </a:p>
@@ -4642,7 +4648,7 @@
           <p:nvPr>
             <p:extLst>
               <p:ext uri="{D42A27DB-BD31-4B8C-83A1-F6EECF244321}">
-                <p14:modId xmlns:p14="http://schemas.microsoft.com/office/powerpoint/2010/main" val="948890679"/>
+                <p14:modId xmlns:p14="http://schemas.microsoft.com/office/powerpoint/2010/main" val="4277103820"/>
               </p:ext>
             </p:extLst>
           </p:nvPr>
@@ -7348,7 +7354,7 @@
         </p:nvSpPr>
         <p:spPr>
           <a:xfrm>
-            <a:off x="7055709" y="2496917"/>
+            <a:off x="7301516" y="2506987"/>
             <a:ext cx="3521676" cy="457200"/>
           </a:xfrm>
           <a:prstGeom prst="rect">
@@ -7416,7 +7422,7 @@
         </p:nvSpPr>
         <p:spPr>
           <a:xfrm>
-            <a:off x="7055709" y="3092375"/>
+            <a:off x="7301516" y="3102445"/>
             <a:ext cx="3521676" cy="457200"/>
           </a:xfrm>
           <a:prstGeom prst="rect">
@@ -7480,7 +7486,7 @@
         </p:nvSpPr>
         <p:spPr>
           <a:xfrm>
-            <a:off x="7055709" y="3666307"/>
+            <a:off x="7301516" y="3676377"/>
             <a:ext cx="3521676" cy="1251682"/>
           </a:xfrm>
           <a:prstGeom prst="rect">
@@ -7541,7 +7547,7 @@
         </p:nvSpPr>
         <p:spPr>
           <a:xfrm>
-            <a:off x="7259635" y="4130868"/>
+            <a:off x="7505442" y="4140938"/>
             <a:ext cx="3113824" cy="265408"/>
           </a:xfrm>
           <a:prstGeom prst="rect">
@@ -7593,7 +7599,7 @@
         </p:nvSpPr>
         <p:spPr>
           <a:xfrm>
-            <a:off x="7259635" y="4473208"/>
+            <a:off x="7505442" y="4483278"/>
             <a:ext cx="3113824" cy="265408"/>
           </a:xfrm>
           <a:prstGeom prst="rect">
@@ -7648,7 +7654,7 @@
         </p:nvCxnSpPr>
         <p:spPr>
           <a:xfrm>
-            <a:off x="8816547" y="2954117"/>
+            <a:off x="9062354" y="2964187"/>
             <a:ext cx="0" cy="138258"/>
           </a:xfrm>
           <a:prstGeom prst="straightConnector1">
@@ -7691,7 +7697,7 @@
         </p:nvCxnSpPr>
         <p:spPr>
           <a:xfrm>
-            <a:off x="8816547" y="3549575"/>
+            <a:off x="9062354" y="3559645"/>
             <a:ext cx="0" cy="116732"/>
           </a:xfrm>
           <a:prstGeom prst="straightConnector1">
@@ -7730,7 +7736,7 @@
         </p:nvSpPr>
         <p:spPr>
           <a:xfrm>
-            <a:off x="7055709" y="5054534"/>
+            <a:off x="7301516" y="5064604"/>
             <a:ext cx="3521676" cy="457200"/>
           </a:xfrm>
           <a:prstGeom prst="rect">
@@ -7800,7 +7806,7 @@
         </p:nvCxnSpPr>
         <p:spPr>
           <a:xfrm>
-            <a:off x="8816547" y="4916276"/>
+            <a:off x="9062354" y="4926346"/>
             <a:ext cx="0" cy="138258"/>
           </a:xfrm>
           <a:prstGeom prst="straightConnector1">
@@ -7857,6 +7863,94 @@
       </p:grpSpPr>
       <p:sp>
         <p:nvSpPr>
+          <p:cNvPr id="2" name="Title 1">
+            <a:extLst>
+              <a:ext uri="{FF2B5EF4-FFF2-40B4-BE49-F238E27FC236}">
+                <a16:creationId xmlns:a16="http://schemas.microsoft.com/office/drawing/2014/main" id="{B6A177AB-FD6A-C24D-9CEB-25391FC40A71}"/>
+              </a:ext>
+            </a:extLst>
+          </p:cNvPr>
+          <p:cNvSpPr>
+            <a:spLocks noGrp="1"/>
+          </p:cNvSpPr>
+          <p:nvPr>
+            <p:ph type="title"/>
+          </p:nvPr>
+        </p:nvSpPr>
+        <p:spPr/>
+        <p:txBody>
+          <a:bodyPr/>
+          <a:lstStyle/>
+          <a:p>
+            <a:r>
+              <a:rPr lang="en-US" dirty="0"/>
+              <a:t>For reference: our SIMULATED WINE PAGE</a:t>
+            </a:r>
+          </a:p>
+        </p:txBody>
+      </p:sp>
+      <p:pic>
+        <p:nvPicPr>
+          <p:cNvPr id="6" name="Picture 5">
+            <a:extLst>
+              <a:ext uri="{FF2B5EF4-FFF2-40B4-BE49-F238E27FC236}">
+                <a16:creationId xmlns:a16="http://schemas.microsoft.com/office/drawing/2014/main" id="{C0096AC5-0378-944A-9994-853F06EC36CB}"/>
+              </a:ext>
+            </a:extLst>
+          </p:cNvPr>
+          <p:cNvPicPr>
+            <a:picLocks noChangeAspect="1"/>
+          </p:cNvPicPr>
+          <p:nvPr/>
+        </p:nvPicPr>
+        <p:blipFill>
+          <a:blip r:embed="rId2"/>
+          <a:stretch>
+            <a:fillRect/>
+          </a:stretch>
+        </p:blipFill>
+        <p:spPr>
+          <a:xfrm>
+            <a:off x="3185535" y="2143397"/>
+            <a:ext cx="5820929" cy="4087586"/>
+          </a:xfrm>
+          <a:prstGeom prst="rect">
+            <a:avLst/>
+          </a:prstGeom>
+        </p:spPr>
+      </p:pic>
+    </p:spTree>
+    <p:extLst>
+      <p:ext uri="{BB962C8B-B14F-4D97-AF65-F5344CB8AC3E}">
+        <p14:creationId xmlns:p14="http://schemas.microsoft.com/office/powerpoint/2010/main" val="3514200409"/>
+      </p:ext>
+    </p:extLst>
+  </p:cSld>
+  <p:clrMapOvr>
+    <a:masterClrMapping/>
+  </p:clrMapOvr>
+</p:sld>
+</file>
+
+<file path=ppt/slides/slide5.xml><?xml version="1.0" encoding="utf-8"?>
+<p:sld xmlns:a="http://schemas.openxmlformats.org/drawingml/2006/main" xmlns:r="http://schemas.openxmlformats.org/officeDocument/2006/relationships" xmlns:p="http://schemas.openxmlformats.org/presentationml/2006/main">
+  <p:cSld>
+    <p:spTree>
+      <p:nvGrpSpPr>
+        <p:cNvPr id="1" name=""/>
+        <p:cNvGrpSpPr/>
+        <p:nvPr/>
+      </p:nvGrpSpPr>
+      <p:grpSpPr>
+        <a:xfrm>
+          <a:off x="0" y="0"/>
+          <a:ext cx="0" cy="0"/>
+          <a:chOff x="0" y="0"/>
+          <a:chExt cx="0" cy="0"/>
+        </a:xfrm>
+      </p:grpSpPr>
+      <p:sp>
+        <p:nvSpPr>
           <p:cNvPr id="7" name="Title 6">
             <a:extLst>
               <a:ext uri="{FF2B5EF4-FFF2-40B4-BE49-F238E27FC236}">
@@ -7935,7 +8029,7 @@
 </p:sld>
 </file>
 
-<file path=ppt/slides/slide5.xml><?xml version="1.0" encoding="utf-8"?>
+<file path=ppt/slides/slide6.xml><?xml version="1.0" encoding="utf-8"?>
 <p:sld xmlns:a="http://schemas.openxmlformats.org/drawingml/2006/main" xmlns:r="http://schemas.openxmlformats.org/officeDocument/2006/relationships" xmlns:p="http://schemas.openxmlformats.org/presentationml/2006/main">
   <p:cSld>
     <p:spTree>

</xml_diff>